<commit_message>
Added coments + own module for RL routines
</commit_message>
<xml_diff>
--- a/Presentation ML4CHEM project 3 iv MO.pptx
+++ b/Presentation ML4CHEM project 3 iv MO.pptx
@@ -131,7 +131,8 @@
 <file path=ppt/revisionInfo.xml><?xml version="1.0" encoding="utf-8"?>
 <p1510:revInfo xmlns:a="http://schemas.openxmlformats.org/drawingml/2006/main" xmlns:r="http://schemas.openxmlformats.org/officeDocument/2006/relationships" xmlns:p1510="http://schemas.microsoft.com/office/powerpoint/2015/10/main">
   <p1510:revLst>
-    <p1510:client id="{DD379FBB-3E73-4587-BD40-EF03F6188E68}" v="419" dt="2024-05-26T17:41:43.952"/>
+    <p1510:client id="{0D4E4E2D-7689-40CB-9490-728AD9C97B9D}" v="1" dt="2024-05-26T18:30:44.821"/>
+    <p1510:client id="{DD379FBB-3E73-4587-BD40-EF03F6188E68}" v="423" dt="2024-05-26T18:19:16.468"/>
   </p1510:revLst>
 </p1510:revInfo>
 </file>
@@ -141,18 +142,18 @@
   <pc:docChgLst>
     <pc:chgData name="Martijn Oele" userId="c93323cb-61ba-4d55-a370-ab980c4c846c" providerId="ADAL" clId="{DD379FBB-3E73-4587-BD40-EF03F6188E68}"/>
     <pc:docChg chg="undo redo custSel addSld delSld modSld modMainMaster">
-      <pc:chgData name="Martijn Oele" userId="c93323cb-61ba-4d55-a370-ab980c4c846c" providerId="ADAL" clId="{DD379FBB-3E73-4587-BD40-EF03F6188E68}" dt="2024-05-26T17:41:43.952" v="5935"/>
+      <pc:chgData name="Martijn Oele" userId="c93323cb-61ba-4d55-a370-ab980c4c846c" providerId="ADAL" clId="{DD379FBB-3E73-4587-BD40-EF03F6188E68}" dt="2024-05-26T18:21:08.470" v="6284" actId="20577"/>
       <pc:docMkLst>
         <pc:docMk/>
       </pc:docMkLst>
       <pc:sldChg chg="modSp new mod">
-        <pc:chgData name="Martijn Oele" userId="c93323cb-61ba-4d55-a370-ab980c4c846c" providerId="ADAL" clId="{DD379FBB-3E73-4587-BD40-EF03F6188E68}" dt="2024-05-26T17:01:36.713" v="4717" actId="6549"/>
+        <pc:chgData name="Martijn Oele" userId="c93323cb-61ba-4d55-a370-ab980c4c846c" providerId="ADAL" clId="{DD379FBB-3E73-4587-BD40-EF03F6188E68}" dt="2024-05-26T17:45:42.244" v="5953" actId="20577"/>
         <pc:sldMkLst>
           <pc:docMk/>
           <pc:sldMk cId="1679501174" sldId="256"/>
         </pc:sldMkLst>
         <pc:spChg chg="mod">
-          <ac:chgData name="Martijn Oele" userId="c93323cb-61ba-4d55-a370-ab980c4c846c" providerId="ADAL" clId="{DD379FBB-3E73-4587-BD40-EF03F6188E68}" dt="2024-05-24T10:39:33.264" v="147" actId="27636"/>
+          <ac:chgData name="Martijn Oele" userId="c93323cb-61ba-4d55-a370-ab980c4c846c" providerId="ADAL" clId="{DD379FBB-3E73-4587-BD40-EF03F6188E68}" dt="2024-05-26T17:45:21.406" v="5938" actId="20577"/>
           <ac:spMkLst>
             <pc:docMk/>
             <pc:sldMk cId="1679501174" sldId="256"/>
@@ -160,7 +161,7 @@
           </ac:spMkLst>
         </pc:spChg>
         <pc:spChg chg="mod">
-          <ac:chgData name="Martijn Oele" userId="c93323cb-61ba-4d55-a370-ab980c4c846c" providerId="ADAL" clId="{DD379FBB-3E73-4587-BD40-EF03F6188E68}" dt="2024-05-26T17:01:36.713" v="4717" actId="6549"/>
+          <ac:chgData name="Martijn Oele" userId="c93323cb-61ba-4d55-a370-ab980c4c846c" providerId="ADAL" clId="{DD379FBB-3E73-4587-BD40-EF03F6188E68}" dt="2024-05-26T17:45:42.244" v="5953" actId="20577"/>
           <ac:spMkLst>
             <pc:docMk/>
             <pc:sldMk cId="1679501174" sldId="256"/>
@@ -169,7 +170,7 @@
         </pc:spChg>
       </pc:sldChg>
       <pc:sldChg chg="addSp delSp modSp new mod">
-        <pc:chgData name="Martijn Oele" userId="c93323cb-61ba-4d55-a370-ab980c4c846c" providerId="ADAL" clId="{DD379FBB-3E73-4587-BD40-EF03F6188E68}" dt="2024-05-26T17:38:28.831" v="5891" actId="1076"/>
+        <pc:chgData name="Martijn Oele" userId="c93323cb-61ba-4d55-a370-ab980c4c846c" providerId="ADAL" clId="{DD379FBB-3E73-4587-BD40-EF03F6188E68}" dt="2024-05-26T17:56:20.116" v="6125" actId="313"/>
         <pc:sldMkLst>
           <pc:docMk/>
           <pc:sldMk cId="1093126335" sldId="257"/>
@@ -183,7 +184,7 @@
           </ac:spMkLst>
         </pc:spChg>
         <pc:spChg chg="mod">
-          <ac:chgData name="Martijn Oele" userId="c93323cb-61ba-4d55-a370-ab980c4c846c" providerId="ADAL" clId="{DD379FBB-3E73-4587-BD40-EF03F6188E68}" dt="2024-05-26T15:14:40.310" v="3586" actId="14100"/>
+          <ac:chgData name="Martijn Oele" userId="c93323cb-61ba-4d55-a370-ab980c4c846c" providerId="ADAL" clId="{DD379FBB-3E73-4587-BD40-EF03F6188E68}" dt="2024-05-26T17:56:20.116" v="6125" actId="313"/>
           <ac:spMkLst>
             <pc:docMk/>
             <pc:sldMk cId="1093126335" sldId="257"/>
@@ -207,7 +208,7 @@
           </ac:spMkLst>
         </pc:spChg>
         <pc:picChg chg="add mod">
-          <ac:chgData name="Martijn Oele" userId="c93323cb-61ba-4d55-a370-ab980c4c846c" providerId="ADAL" clId="{DD379FBB-3E73-4587-BD40-EF03F6188E68}" dt="2024-05-26T15:10:00.764" v="3409" actId="1076"/>
+          <ac:chgData name="Martijn Oele" userId="c93323cb-61ba-4d55-a370-ab980c4c846c" providerId="ADAL" clId="{DD379FBB-3E73-4587-BD40-EF03F6188E68}" dt="2024-05-26T17:55:41.740" v="6099" actId="1076"/>
           <ac:picMkLst>
             <pc:docMk/>
             <pc:sldMk cId="1093126335" sldId="257"/>
@@ -224,7 +225,7 @@
         </pc:picChg>
       </pc:sldChg>
       <pc:sldChg chg="addSp modSp new mod">
-        <pc:chgData name="Martijn Oele" userId="c93323cb-61ba-4d55-a370-ab980c4c846c" providerId="ADAL" clId="{DD379FBB-3E73-4587-BD40-EF03F6188E68}" dt="2024-05-26T17:38:41.796" v="5895" actId="1076"/>
+        <pc:chgData name="Martijn Oele" userId="c93323cb-61ba-4d55-a370-ab980c4c846c" providerId="ADAL" clId="{DD379FBB-3E73-4587-BD40-EF03F6188E68}" dt="2024-05-26T18:08:28.126" v="6195" actId="20577"/>
         <pc:sldMkLst>
           <pc:docMk/>
           <pc:sldMk cId="1203030831" sldId="258"/>
@@ -238,7 +239,7 @@
           </ac:spMkLst>
         </pc:spChg>
         <pc:spChg chg="mod">
-          <ac:chgData name="Martijn Oele" userId="c93323cb-61ba-4d55-a370-ab980c4c846c" providerId="ADAL" clId="{DD379FBB-3E73-4587-BD40-EF03F6188E68}" dt="2024-05-26T17:24:04.862" v="5548" actId="20577"/>
+          <ac:chgData name="Martijn Oele" userId="c93323cb-61ba-4d55-a370-ab980c4c846c" providerId="ADAL" clId="{DD379FBB-3E73-4587-BD40-EF03F6188E68}" dt="2024-05-26T18:08:28.126" v="6195" actId="20577"/>
           <ac:spMkLst>
             <pc:docMk/>
             <pc:sldMk cId="1203030831" sldId="258"/>
@@ -286,7 +287,7 @@
         </pc:spChg>
       </pc:sldChg>
       <pc:sldChg chg="addSp delSp modSp new mod">
-        <pc:chgData name="Martijn Oele" userId="c93323cb-61ba-4d55-a370-ab980c4c846c" providerId="ADAL" clId="{DD379FBB-3E73-4587-BD40-EF03F6188E68}" dt="2024-05-25T23:50:15.553" v="3176" actId="14100"/>
+        <pc:chgData name="Martijn Oele" userId="c93323cb-61ba-4d55-a370-ab980c4c846c" providerId="ADAL" clId="{DD379FBB-3E73-4587-BD40-EF03F6188E68}" dt="2024-05-26T17:53:26.754" v="6097" actId="20577"/>
         <pc:sldMkLst>
           <pc:docMk/>
           <pc:sldMk cId="250914193" sldId="260"/>
@@ -300,7 +301,7 @@
           </ac:spMkLst>
         </pc:spChg>
         <pc:spChg chg="mod ord">
-          <ac:chgData name="Martijn Oele" userId="c93323cb-61ba-4d55-a370-ab980c4c846c" providerId="ADAL" clId="{DD379FBB-3E73-4587-BD40-EF03F6188E68}" dt="2024-05-24T20:54:34.525" v="807" actId="14100"/>
+          <ac:chgData name="Martijn Oele" userId="c93323cb-61ba-4d55-a370-ab980c4c846c" providerId="ADAL" clId="{DD379FBB-3E73-4587-BD40-EF03F6188E68}" dt="2024-05-26T17:53:26.754" v="6097" actId="20577"/>
           <ac:spMkLst>
             <pc:docMk/>
             <pc:sldMk cId="250914193" sldId="260"/>
@@ -380,7 +381,7 @@
         </pc:sldMkLst>
       </pc:sldChg>
       <pc:sldChg chg="modSp new mod">
-        <pc:chgData name="Martijn Oele" userId="c93323cb-61ba-4d55-a370-ab980c4c846c" providerId="ADAL" clId="{DD379FBB-3E73-4587-BD40-EF03F6188E68}" dt="2024-05-26T17:30:17.907" v="5807" actId="313"/>
+        <pc:chgData name="Martijn Oele" userId="c93323cb-61ba-4d55-a370-ab980c4c846c" providerId="ADAL" clId="{DD379FBB-3E73-4587-BD40-EF03F6188E68}" dt="2024-05-26T18:21:08.470" v="6284" actId="20577"/>
         <pc:sldMkLst>
           <pc:docMk/>
           <pc:sldMk cId="45723674" sldId="261"/>
@@ -394,7 +395,7 @@
           </ac:spMkLst>
         </pc:spChg>
         <pc:spChg chg="mod">
-          <ac:chgData name="Martijn Oele" userId="c93323cb-61ba-4d55-a370-ab980c4c846c" providerId="ADAL" clId="{DD379FBB-3E73-4587-BD40-EF03F6188E68}" dt="2024-05-26T17:30:17.907" v="5807" actId="313"/>
+          <ac:chgData name="Martijn Oele" userId="c93323cb-61ba-4d55-a370-ab980c4c846c" providerId="ADAL" clId="{DD379FBB-3E73-4587-BD40-EF03F6188E68}" dt="2024-05-26T18:21:08.470" v="6284" actId="20577"/>
           <ac:spMkLst>
             <pc:docMk/>
             <pc:sldMk cId="45723674" sldId="261"/>
@@ -417,7 +418,7 @@
         </pc:sldMkLst>
       </pc:sldChg>
       <pc:sldChg chg="addSp delSp modSp new mod">
-        <pc:chgData name="Martijn Oele" userId="c93323cb-61ba-4d55-a370-ab980c4c846c" providerId="ADAL" clId="{DD379FBB-3E73-4587-BD40-EF03F6188E68}" dt="2024-05-26T17:29:10.608" v="5760" actId="20577"/>
+        <pc:chgData name="Martijn Oele" userId="c93323cb-61ba-4d55-a370-ab980c4c846c" providerId="ADAL" clId="{DD379FBB-3E73-4587-BD40-EF03F6188E68}" dt="2024-05-26T18:05:07.736" v="6183" actId="20577"/>
         <pc:sldMkLst>
           <pc:docMk/>
           <pc:sldMk cId="3543060941" sldId="262"/>
@@ -431,11 +432,19 @@
           </ac:spMkLst>
         </pc:spChg>
         <pc:spChg chg="add del mod">
-          <ac:chgData name="Martijn Oele" userId="c93323cb-61ba-4d55-a370-ab980c4c846c" providerId="ADAL" clId="{DD379FBB-3E73-4587-BD40-EF03F6188E68}" dt="2024-05-26T17:29:10.608" v="5760" actId="20577"/>
+          <ac:chgData name="Martijn Oele" userId="c93323cb-61ba-4d55-a370-ab980c4c846c" providerId="ADAL" clId="{DD379FBB-3E73-4587-BD40-EF03F6188E68}" dt="2024-05-26T18:05:07.736" v="6183" actId="20577"/>
           <ac:spMkLst>
             <pc:docMk/>
             <pc:sldMk cId="3543060941" sldId="262"/>
             <ac:spMk id="3" creationId="{46221F79-A9B0-92AE-4CB6-81272F8DF4AC}"/>
+          </ac:spMkLst>
+        </pc:spChg>
+        <pc:spChg chg="add mod">
+          <ac:chgData name="Martijn Oele" userId="c93323cb-61ba-4d55-a370-ab980c4c846c" providerId="ADAL" clId="{DD379FBB-3E73-4587-BD40-EF03F6188E68}" dt="2024-05-26T17:52:41.221" v="6076"/>
+          <ac:spMkLst>
+            <pc:docMk/>
+            <pc:sldMk cId="3543060941" sldId="262"/>
+            <ac:spMk id="5" creationId="{34648250-D881-ABEE-942B-C9C516DE2273}"/>
           </ac:spMkLst>
         </pc:spChg>
         <pc:picChg chg="add mod">
@@ -519,7 +528,7 @@
         </pc:cxnChg>
       </pc:sldChg>
       <pc:sldChg chg="addSp delSp modSp new mod setBg delAnim modAnim">
-        <pc:chgData name="Martijn Oele" userId="c93323cb-61ba-4d55-a370-ab980c4c846c" providerId="ADAL" clId="{DD379FBB-3E73-4587-BD40-EF03F6188E68}" dt="2024-05-25T23:56:58.162" v="3219" actId="1076"/>
+        <pc:chgData name="Martijn Oele" userId="c93323cb-61ba-4d55-a370-ab980c4c846c" providerId="ADAL" clId="{DD379FBB-3E73-4587-BD40-EF03F6188E68}" dt="2024-05-26T18:07:56.749" v="6189" actId="20577"/>
         <pc:sldMkLst>
           <pc:docMk/>
           <pc:sldMk cId="3345334393" sldId="264"/>
@@ -533,7 +542,7 @@
           </ac:spMkLst>
         </pc:spChg>
         <pc:spChg chg="mod">
-          <ac:chgData name="Martijn Oele" userId="c93323cb-61ba-4d55-a370-ab980c4c846c" providerId="ADAL" clId="{DD379FBB-3E73-4587-BD40-EF03F6188E68}" dt="2024-05-25T23:56:55.306" v="3217" actId="313"/>
+          <ac:chgData name="Martijn Oele" userId="c93323cb-61ba-4d55-a370-ab980c4c846c" providerId="ADAL" clId="{DD379FBB-3E73-4587-BD40-EF03F6188E68}" dt="2024-05-26T18:07:56.749" v="6189" actId="20577"/>
           <ac:spMkLst>
             <pc:docMk/>
             <pc:sldMk cId="3345334393" sldId="264"/>
@@ -622,7 +631,7 @@
         </pc:picChg>
       </pc:sldChg>
       <pc:sldChg chg="addSp delSp modSp new mod delAnim modAnim">
-        <pc:chgData name="Martijn Oele" userId="c93323cb-61ba-4d55-a370-ab980c4c846c" providerId="ADAL" clId="{DD379FBB-3E73-4587-BD40-EF03F6188E68}" dt="2024-05-25T23:49:15.578" v="3162" actId="732"/>
+        <pc:chgData name="Martijn Oele" userId="c93323cb-61ba-4d55-a370-ab980c4c846c" providerId="ADAL" clId="{DD379FBB-3E73-4587-BD40-EF03F6188E68}" dt="2024-05-26T18:19:16.468" v="6263"/>
         <pc:sldMkLst>
           <pc:docMk/>
           <pc:sldMk cId="1890579209" sldId="265"/>
@@ -636,7 +645,7 @@
           </ac:spMkLst>
         </pc:spChg>
         <pc:spChg chg="add del mod">
-          <ac:chgData name="Martijn Oele" userId="c93323cb-61ba-4d55-a370-ab980c4c846c" providerId="ADAL" clId="{DD379FBB-3E73-4587-BD40-EF03F6188E68}" dt="2024-05-25T23:48:10.332" v="3159" actId="20577"/>
+          <ac:chgData name="Martijn Oele" userId="c93323cb-61ba-4d55-a370-ab980c4c846c" providerId="ADAL" clId="{DD379FBB-3E73-4587-BD40-EF03F6188E68}" dt="2024-05-26T18:11:45.274" v="6202" actId="20577"/>
           <ac:spMkLst>
             <pc:docMk/>
             <pc:sldMk cId="1890579209" sldId="265"/>
@@ -675,6 +684,14 @@
             <ac:spMk id="14" creationId="{51B29492-7268-981A-21FB-702E4FB4D7EF}"/>
           </ac:spMkLst>
         </pc:spChg>
+        <pc:picChg chg="add mod ord">
+          <ac:chgData name="Martijn Oele" userId="c93323cb-61ba-4d55-a370-ab980c4c846c" providerId="ADAL" clId="{DD379FBB-3E73-4587-BD40-EF03F6188E68}" dt="2024-05-26T18:19:02.131" v="6261" actId="167"/>
+          <ac:picMkLst>
+            <pc:docMk/>
+            <pc:sldMk cId="1890579209" sldId="265"/>
+            <ac:picMk id="6" creationId="{4E6B0D5A-44A3-6A66-D7BF-7DFF511A276E}"/>
+          </ac:picMkLst>
+        </pc:picChg>
         <pc:picChg chg="add del mod">
           <ac:chgData name="Martijn Oele" userId="c93323cb-61ba-4d55-a370-ab980c4c846c" providerId="ADAL" clId="{DD379FBB-3E73-4587-BD40-EF03F6188E68}" dt="2024-05-25T23:45:15.119" v="3120" actId="478"/>
           <ac:picMkLst>
@@ -707,8 +724,8 @@
             <ac:picMk id="12" creationId="{165E40AA-CE2E-DA1E-FF28-A21E008D61C0}"/>
           </ac:picMkLst>
         </pc:picChg>
-        <pc:picChg chg="add mod">
-          <ac:chgData name="Martijn Oele" userId="c93323cb-61ba-4d55-a370-ab980c4c846c" providerId="ADAL" clId="{DD379FBB-3E73-4587-BD40-EF03F6188E68}" dt="2024-05-25T23:34:04.093" v="3066" actId="1076"/>
+        <pc:picChg chg="add del mod">
+          <ac:chgData name="Martijn Oele" userId="c93323cb-61ba-4d55-a370-ab980c4c846c" providerId="ADAL" clId="{DD379FBB-3E73-4587-BD40-EF03F6188E68}" dt="2024-05-26T18:18:11.512" v="6252" actId="478"/>
           <ac:picMkLst>
             <pc:docMk/>
             <pc:sldMk cId="1890579209" sldId="265"/>
@@ -732,7 +749,7 @@
           </ac:picMkLst>
         </pc:picChg>
         <pc:picChg chg="add mod ord">
-          <ac:chgData name="Martijn Oele" userId="c93323cb-61ba-4d55-a370-ab980c4c846c" providerId="ADAL" clId="{DD379FBB-3E73-4587-BD40-EF03F6188E68}" dt="2024-05-25T23:45:53.538" v="3132" actId="167"/>
+          <ac:chgData name="Martijn Oele" userId="c93323cb-61ba-4d55-a370-ab980c4c846c" providerId="ADAL" clId="{DD379FBB-3E73-4587-BD40-EF03F6188E68}" dt="2024-05-26T18:12:23.591" v="6251" actId="1038"/>
           <ac:picMkLst>
             <pc:docMk/>
             <pc:sldMk cId="1890579209" sldId="265"/>
@@ -765,7 +782,7 @@
         </pc:picChg>
       </pc:sldChg>
       <pc:sldChg chg="addSp delSp modSp new mod">
-        <pc:chgData name="Martijn Oele" userId="c93323cb-61ba-4d55-a370-ab980c4c846c" providerId="ADAL" clId="{DD379FBB-3E73-4587-BD40-EF03F6188E68}" dt="2024-05-26T17:39:01.786" v="5900"/>
+        <pc:chgData name="Martijn Oele" userId="c93323cb-61ba-4d55-a370-ab980c4c846c" providerId="ADAL" clId="{DD379FBB-3E73-4587-BD40-EF03F6188E68}" dt="2024-05-26T18:00:03.444" v="6158" actId="6549"/>
         <pc:sldMkLst>
           <pc:docMk/>
           <pc:sldMk cId="1621567964" sldId="266"/>
@@ -779,7 +796,7 @@
           </ac:spMkLst>
         </pc:spChg>
         <pc:spChg chg="mod">
-          <ac:chgData name="Martijn Oele" userId="c93323cb-61ba-4d55-a370-ab980c4c846c" providerId="ADAL" clId="{DD379FBB-3E73-4587-BD40-EF03F6188E68}" dt="2024-05-25T22:13:36.623" v="2411" actId="20577"/>
+          <ac:chgData name="Martijn Oele" userId="c93323cb-61ba-4d55-a370-ab980c4c846c" providerId="ADAL" clId="{DD379FBB-3E73-4587-BD40-EF03F6188E68}" dt="2024-05-26T18:00:03.444" v="6158" actId="6549"/>
           <ac:spMkLst>
             <pc:docMk/>
             <pc:sldMk cId="1621567964" sldId="266"/>
@@ -1208,7 +1225,7 @@
         </pc:cxnChg>
       </pc:sldChg>
       <pc:sldChg chg="addSp modSp new mod">
-        <pc:chgData name="Martijn Oele" userId="c93323cb-61ba-4d55-a370-ab980c4c846c" providerId="ADAL" clId="{DD379FBB-3E73-4587-BD40-EF03F6188E68}" dt="2024-05-26T17:41:43.952" v="5935"/>
+        <pc:chgData name="Martijn Oele" userId="c93323cb-61ba-4d55-a370-ab980c4c846c" providerId="ADAL" clId="{DD379FBB-3E73-4587-BD40-EF03F6188E68}" dt="2024-05-26T17:49:43.331" v="5972" actId="20577"/>
         <pc:sldMkLst>
           <pc:docMk/>
           <pc:sldMk cId="2212627288" sldId="270"/>
@@ -1222,7 +1239,7 @@
           </ac:spMkLst>
         </pc:spChg>
         <pc:spChg chg="mod">
-          <ac:chgData name="Martijn Oele" userId="c93323cb-61ba-4d55-a370-ab980c4c846c" providerId="ADAL" clId="{DD379FBB-3E73-4587-BD40-EF03F6188E68}" dt="2024-05-26T17:07:42.036" v="5008" actId="14100"/>
+          <ac:chgData name="Martijn Oele" userId="c93323cb-61ba-4d55-a370-ab980c4c846c" providerId="ADAL" clId="{DD379FBB-3E73-4587-BD40-EF03F6188E68}" dt="2024-05-26T17:49:43.331" v="5972" actId="20577"/>
           <ac:spMkLst>
             <pc:docMk/>
             <pc:sldMk cId="2212627288" sldId="270"/>
@@ -1318,6 +1335,113 @@
           </pc:spChg>
         </pc:sldLayoutChg>
       </pc:sldMasterChg>
+    </pc:docChg>
+  </pc:docChgLst>
+  <pc:docChgLst>
+    <pc:chgData name="Martijn Oele" userId="c93323cb-61ba-4d55-a370-ab980c4c846c" providerId="ADAL" clId="{0D4E4E2D-7689-40CB-9490-728AD9C97B9D}"/>
+    <pc:docChg chg="modSld">
+      <pc:chgData name="Martijn Oele" userId="c93323cb-61ba-4d55-a370-ab980c4c846c" providerId="ADAL" clId="{0D4E4E2D-7689-40CB-9490-728AD9C97B9D}" dt="2024-05-26T18:30:44.819" v="0"/>
+      <pc:docMkLst>
+        <pc:docMk/>
+      </pc:docMkLst>
+      <pc:sldChg chg="modTransition">
+        <pc:chgData name="Martijn Oele" userId="c93323cb-61ba-4d55-a370-ab980c4c846c" providerId="ADAL" clId="{0D4E4E2D-7689-40CB-9490-728AD9C97B9D}" dt="2024-05-26T18:30:44.819" v="0"/>
+        <pc:sldMkLst>
+          <pc:docMk/>
+          <pc:sldMk cId="1679501174" sldId="256"/>
+        </pc:sldMkLst>
+      </pc:sldChg>
+      <pc:sldChg chg="modTransition">
+        <pc:chgData name="Martijn Oele" userId="c93323cb-61ba-4d55-a370-ab980c4c846c" providerId="ADAL" clId="{0D4E4E2D-7689-40CB-9490-728AD9C97B9D}" dt="2024-05-26T18:30:44.819" v="0"/>
+        <pc:sldMkLst>
+          <pc:docMk/>
+          <pc:sldMk cId="1093126335" sldId="257"/>
+        </pc:sldMkLst>
+      </pc:sldChg>
+      <pc:sldChg chg="modTransition">
+        <pc:chgData name="Martijn Oele" userId="c93323cb-61ba-4d55-a370-ab980c4c846c" providerId="ADAL" clId="{0D4E4E2D-7689-40CB-9490-728AD9C97B9D}" dt="2024-05-26T18:30:44.819" v="0"/>
+        <pc:sldMkLst>
+          <pc:docMk/>
+          <pc:sldMk cId="1203030831" sldId="258"/>
+        </pc:sldMkLst>
+      </pc:sldChg>
+      <pc:sldChg chg="modTransition">
+        <pc:chgData name="Martijn Oele" userId="c93323cb-61ba-4d55-a370-ab980c4c846c" providerId="ADAL" clId="{0D4E4E2D-7689-40CB-9490-728AD9C97B9D}" dt="2024-05-26T18:30:44.819" v="0"/>
+        <pc:sldMkLst>
+          <pc:docMk/>
+          <pc:sldMk cId="3978102911" sldId="259"/>
+        </pc:sldMkLst>
+      </pc:sldChg>
+      <pc:sldChg chg="modTransition">
+        <pc:chgData name="Martijn Oele" userId="c93323cb-61ba-4d55-a370-ab980c4c846c" providerId="ADAL" clId="{0D4E4E2D-7689-40CB-9490-728AD9C97B9D}" dt="2024-05-26T18:30:44.819" v="0"/>
+        <pc:sldMkLst>
+          <pc:docMk/>
+          <pc:sldMk cId="250914193" sldId="260"/>
+        </pc:sldMkLst>
+      </pc:sldChg>
+      <pc:sldChg chg="modTransition">
+        <pc:chgData name="Martijn Oele" userId="c93323cb-61ba-4d55-a370-ab980c4c846c" providerId="ADAL" clId="{0D4E4E2D-7689-40CB-9490-728AD9C97B9D}" dt="2024-05-26T18:30:44.819" v="0"/>
+        <pc:sldMkLst>
+          <pc:docMk/>
+          <pc:sldMk cId="45723674" sldId="261"/>
+        </pc:sldMkLst>
+      </pc:sldChg>
+      <pc:sldChg chg="modTransition">
+        <pc:chgData name="Martijn Oele" userId="c93323cb-61ba-4d55-a370-ab980c4c846c" providerId="ADAL" clId="{0D4E4E2D-7689-40CB-9490-728AD9C97B9D}" dt="2024-05-26T18:30:44.819" v="0"/>
+        <pc:sldMkLst>
+          <pc:docMk/>
+          <pc:sldMk cId="3543060941" sldId="262"/>
+        </pc:sldMkLst>
+      </pc:sldChg>
+      <pc:sldChg chg="modTransition">
+        <pc:chgData name="Martijn Oele" userId="c93323cb-61ba-4d55-a370-ab980c4c846c" providerId="ADAL" clId="{0D4E4E2D-7689-40CB-9490-728AD9C97B9D}" dt="2024-05-26T18:30:44.819" v="0"/>
+        <pc:sldMkLst>
+          <pc:docMk/>
+          <pc:sldMk cId="2695715349" sldId="263"/>
+        </pc:sldMkLst>
+      </pc:sldChg>
+      <pc:sldChg chg="modTransition">
+        <pc:chgData name="Martijn Oele" userId="c93323cb-61ba-4d55-a370-ab980c4c846c" providerId="ADAL" clId="{0D4E4E2D-7689-40CB-9490-728AD9C97B9D}" dt="2024-05-26T18:30:44.819" v="0"/>
+        <pc:sldMkLst>
+          <pc:docMk/>
+          <pc:sldMk cId="3345334393" sldId="264"/>
+        </pc:sldMkLst>
+      </pc:sldChg>
+      <pc:sldChg chg="modTransition">
+        <pc:chgData name="Martijn Oele" userId="c93323cb-61ba-4d55-a370-ab980c4c846c" providerId="ADAL" clId="{0D4E4E2D-7689-40CB-9490-728AD9C97B9D}" dt="2024-05-26T18:30:44.819" v="0"/>
+        <pc:sldMkLst>
+          <pc:docMk/>
+          <pc:sldMk cId="1890579209" sldId="265"/>
+        </pc:sldMkLst>
+      </pc:sldChg>
+      <pc:sldChg chg="modTransition">
+        <pc:chgData name="Martijn Oele" userId="c93323cb-61ba-4d55-a370-ab980c4c846c" providerId="ADAL" clId="{0D4E4E2D-7689-40CB-9490-728AD9C97B9D}" dt="2024-05-26T18:30:44.819" v="0"/>
+        <pc:sldMkLst>
+          <pc:docMk/>
+          <pc:sldMk cId="1621567964" sldId="266"/>
+        </pc:sldMkLst>
+      </pc:sldChg>
+      <pc:sldChg chg="modTransition">
+        <pc:chgData name="Martijn Oele" userId="c93323cb-61ba-4d55-a370-ab980c4c846c" providerId="ADAL" clId="{0D4E4E2D-7689-40CB-9490-728AD9C97B9D}" dt="2024-05-26T18:30:44.819" v="0"/>
+        <pc:sldMkLst>
+          <pc:docMk/>
+          <pc:sldMk cId="2730127437" sldId="268"/>
+        </pc:sldMkLst>
+      </pc:sldChg>
+      <pc:sldChg chg="modTransition">
+        <pc:chgData name="Martijn Oele" userId="c93323cb-61ba-4d55-a370-ab980c4c846c" providerId="ADAL" clId="{0D4E4E2D-7689-40CB-9490-728AD9C97B9D}" dt="2024-05-26T18:30:44.819" v="0"/>
+        <pc:sldMkLst>
+          <pc:docMk/>
+          <pc:sldMk cId="3322853809" sldId="269"/>
+        </pc:sldMkLst>
+      </pc:sldChg>
+      <pc:sldChg chg="modTransition">
+        <pc:chgData name="Martijn Oele" userId="c93323cb-61ba-4d55-a370-ab980c4c846c" providerId="ADAL" clId="{0D4E4E2D-7689-40CB-9490-728AD9C97B9D}" dt="2024-05-26T18:30:44.819" v="0"/>
+        <pc:sldMkLst>
+          <pc:docMk/>
+          <pc:sldMk cId="2212627288" sldId="270"/>
+        </pc:sldMkLst>
+      </pc:sldChg>
     </pc:docChg>
   </pc:docChgLst>
 </pc:chgInfo>
@@ -1906,7 +2030,7 @@
           <a:p>
             <a:fld id="{AB665A03-41AD-4B62-AC5C-7465C7882560}" type="datetime8">
               <a:rPr lang="en-NL" smtClean="0"/>
-              <a:t>26/05/2024 16:28</a:t>
+              <a:t>26/05/2024 20:30</a:t>
             </a:fld>
             <a:endParaRPr lang="en-NL"/>
           </a:p>
@@ -2106,7 +2230,7 @@
           <a:p>
             <a:fld id="{D2CE5D1E-AB27-49F4-A71C-FEC85572B4DB}" type="datetime8">
               <a:rPr lang="en-NL" smtClean="0"/>
-              <a:t>26/05/2024 16:28</a:t>
+              <a:t>26/05/2024 20:30</a:t>
             </a:fld>
             <a:endParaRPr lang="en-NL"/>
           </a:p>
@@ -2316,7 +2440,7 @@
           <a:p>
             <a:fld id="{76A2EAB2-EE27-46BB-BE28-C77B15B51583}" type="datetime8">
               <a:rPr lang="en-NL" smtClean="0"/>
-              <a:t>26/05/2024 16:28</a:t>
+              <a:t>26/05/2024 20:30</a:t>
             </a:fld>
             <a:endParaRPr lang="en-NL"/>
           </a:p>
@@ -2516,7 +2640,7 @@
           <a:p>
             <a:fld id="{8799EA89-3441-4AD8-B0E2-81E7F841C0C8}" type="datetime8">
               <a:rPr lang="en-NL" smtClean="0"/>
-              <a:t>26/05/2024 16:28</a:t>
+              <a:t>26/05/2024 20:30</a:t>
             </a:fld>
             <a:endParaRPr lang="en-NL"/>
           </a:p>
@@ -2792,7 +2916,7 @@
           <a:p>
             <a:fld id="{4F3998DE-9D4F-44F0-9753-6EACE41055FB}" type="datetime8">
               <a:rPr lang="en-NL" smtClean="0"/>
-              <a:t>26/05/2024 16:28</a:t>
+              <a:t>26/05/2024 20:30</a:t>
             </a:fld>
             <a:endParaRPr lang="en-NL"/>
           </a:p>
@@ -3060,7 +3184,7 @@
           <a:p>
             <a:fld id="{5D1EF520-AB7E-4799-BAAF-3B4F86507ACA}" type="datetime8">
               <a:rPr lang="en-NL" smtClean="0"/>
-              <a:t>26/05/2024 16:28</a:t>
+              <a:t>26/05/2024 20:30</a:t>
             </a:fld>
             <a:endParaRPr lang="en-NL"/>
           </a:p>
@@ -3475,7 +3599,7 @@
           <a:p>
             <a:fld id="{87FA0F38-53A5-4861-9820-92EC3D8B540C}" type="datetime8">
               <a:rPr lang="en-NL" smtClean="0"/>
-              <a:t>26/05/2024 16:28</a:t>
+              <a:t>26/05/2024 20:30</a:t>
             </a:fld>
             <a:endParaRPr lang="en-NL"/>
           </a:p>
@@ -3617,7 +3741,7 @@
           <a:p>
             <a:fld id="{7610EB54-7389-4689-8909-B219C709D18C}" type="datetime8">
               <a:rPr lang="en-NL" smtClean="0"/>
-              <a:t>26/05/2024 16:28</a:t>
+              <a:t>26/05/2024 20:30</a:t>
             </a:fld>
             <a:endParaRPr lang="en-NL"/>
           </a:p>
@@ -3730,7 +3854,7 @@
           <a:p>
             <a:fld id="{2AF4500C-CAFF-4824-8F4D-B0F9FD41FD6D}" type="datetime8">
               <a:rPr lang="en-NL" smtClean="0"/>
-              <a:t>26/05/2024 16:28</a:t>
+              <a:t>26/05/2024 20:30</a:t>
             </a:fld>
             <a:endParaRPr lang="en-NL"/>
           </a:p>
@@ -4043,7 +4167,7 @@
           <a:p>
             <a:fld id="{79AA8484-8842-4F97-AC0D-29DD15A18A58}" type="datetime8">
               <a:rPr lang="en-NL" smtClean="0"/>
-              <a:t>26/05/2024 16:28</a:t>
+              <a:t>26/05/2024 20:30</a:t>
             </a:fld>
             <a:endParaRPr lang="en-NL"/>
           </a:p>
@@ -4332,7 +4456,7 @@
           <a:p>
             <a:fld id="{A626F83A-E09F-4A05-9B53-A5A1F2928E17}" type="datetime8">
               <a:rPr lang="en-NL" smtClean="0"/>
-              <a:t>26/05/2024 16:28</a:t>
+              <a:t>26/05/2024 20:30</a:t>
             </a:fld>
             <a:endParaRPr lang="en-NL"/>
           </a:p>
@@ -4629,7 +4753,7 @@
           <a:p>
             <a:fld id="{4D8F415E-FDEA-4A00-88C3-DBF74FF60C54}" type="datetime8">
               <a:rPr lang="en-NL" smtClean="0"/>
-              <a:t>26/05/2024 16:28</a:t>
+              <a:t>26/05/2024 20:30</a:t>
             </a:fld>
             <a:endParaRPr lang="en-NL"/>
           </a:p>
@@ -5140,10 +5264,15 @@
             <p:ph type="subTitle" idx="1"/>
           </p:nvPr>
         </p:nvSpPr>
-        <p:spPr/>
+        <p:spPr>
+          <a:xfrm>
+            <a:off x="1524000" y="3602037"/>
+            <a:ext cx="9144000" cy="2594577"/>
+          </a:xfrm>
+        </p:spPr>
         <p:txBody>
           <a:bodyPr>
-            <a:normAutofit lnSpcReduction="10000"/>
+            <a:normAutofit/>
           </a:bodyPr>
           <a:lstStyle/>
           <a:p>
@@ -5181,6 +5310,12 @@
             <a:r>
               <a:rPr lang="en-US" dirty="0"/>
               <a:t>Machine Learning in Chemistry</a:t>
+            </a:r>
+          </a:p>
+          <a:p>
+            <a:r>
+              <a:rPr lang="en-US" dirty="0"/>
+              <a:t>27-5-2024</a:t>
             </a:r>
             <a:endParaRPr lang="en-NL" dirty="0"/>
           </a:p>
@@ -5225,6 +5360,18 @@
   <p:clrMapOvr>
     <a:masterClrMapping/>
   </p:clrMapOvr>
+  <mc:AlternateContent xmlns:mc="http://schemas.openxmlformats.org/markup-compatibility/2006">
+    <mc:Choice xmlns:p159="http://schemas.microsoft.com/office/powerpoint/2015/09/main" Requires="p159">
+      <p:transition xmlns:p14="http://schemas.microsoft.com/office/powerpoint/2010/main" spd="slow" p14:dur="2000">
+        <p159:morph option="byObject"/>
+      </p:transition>
+    </mc:Choice>
+    <mc:Fallback>
+      <p:transition spd="slow">
+        <p:fade/>
+      </p:transition>
+    </mc:Fallback>
+  </mc:AlternateContent>
 </p:sld>
 </file>
 
@@ -5357,13 +5504,13 @@
         </p:nvSpPr>
         <p:spPr>
           <a:xfrm>
-            <a:off x="838199" y="1825625"/>
+            <a:off x="838200" y="1473371"/>
             <a:ext cx="11268076" cy="2327276"/>
           </a:xfrm>
         </p:spPr>
         <p:txBody>
           <a:bodyPr numCol="2">
-            <a:normAutofit/>
+            <a:normAutofit lnSpcReduction="10000"/>
           </a:bodyPr>
           <a:lstStyle/>
           <a:p>
@@ -5385,6 +5532,9 @@
             <a:endParaRPr lang="en-US" dirty="0"/>
           </a:p>
           <a:p>
+            <a:endParaRPr lang="en-US" dirty="0"/>
+          </a:p>
+          <a:p>
             <a:r>
               <a:rPr lang="en-US" dirty="0"/>
               <a:t>Learning rate of 0,001</a:t>
@@ -5394,6 +5544,13 @@
             <a:r>
               <a:rPr lang="en-US" dirty="0"/>
               <a:t>Approximately 2.5 hours (CUDA)</a:t>
+            </a:r>
+          </a:p>
+          <a:p>
+            <a:pPr lvl="1"/>
+            <a:r>
+              <a:rPr lang="en-US" dirty="0"/>
+              <a:t>5,5 GB VRAM</a:t>
             </a:r>
           </a:p>
           <a:p>
@@ -5454,6 +5611,18 @@
   <p:clrMapOvr>
     <a:masterClrMapping/>
   </p:clrMapOvr>
+  <mc:AlternateContent xmlns:mc="http://schemas.openxmlformats.org/markup-compatibility/2006">
+    <mc:Choice xmlns:p159="http://schemas.microsoft.com/office/powerpoint/2015/09/main" Requires="p159">
+      <p:transition xmlns:p14="http://schemas.microsoft.com/office/powerpoint/2010/main" spd="slow" p14:dur="2000">
+        <p159:morph option="byObject"/>
+      </p:transition>
+    </mc:Choice>
+    <mc:Fallback>
+      <p:transition spd="slow">
+        <p:fade/>
+      </p:transition>
+    </mc:Fallback>
+  </mc:AlternateContent>
 </p:sld>
 </file>
 
@@ -5526,40 +5695,41 @@
           </a:xfrm>
         </p:spPr>
         <p:txBody>
-          <a:bodyPr/>
-          <a:lstStyle/>
-          <a:p>
-            <a:r>
-              <a:rPr lang="en-US" dirty="0"/>
-              <a:t>~85% valid smiles (n=10 000)</a:t>
+          <a:bodyPr>
+            <a:normAutofit/>
+          </a:bodyPr>
+          <a:lstStyle/>
+          <a:p>
+            <a:r>
+              <a:rPr lang="en-US" dirty="0"/>
+              <a:t>~85% valid SMILES (n=10 000)</a:t>
             </a:r>
           </a:p>
           <a:p>
             <a:pPr lvl="1"/>
             <a:r>
               <a:rPr lang="en-US" dirty="0"/>
-              <a:t>Temperature</a:t>
-            </a:r>
-          </a:p>
-          <a:p>
-            <a:pPr lvl="2"/>
-            <a:r>
-              <a:rPr lang="en-US" dirty="0"/>
-              <a:t>Higher less valid smiles</a:t>
-            </a:r>
-          </a:p>
-          <a:p>
-            <a:pPr lvl="2"/>
-            <a:r>
-              <a:rPr lang="en-US" dirty="0"/>
-              <a:t>Lower less more smiles</a:t>
-            </a:r>
-          </a:p>
-          <a:p>
-            <a:pPr lvl="2"/>
-            <a:r>
-              <a:rPr lang="en-US" dirty="0"/>
-              <a:t>Temperature of 1 used</a:t>
+              <a:t>Temperature of 1.</a:t>
+            </a:r>
+          </a:p>
+          <a:p>
+            <a:r>
+              <a:rPr lang="en-US" dirty="0"/>
+              <a:t>Literature 22 epochs </a:t>
+            </a:r>
+          </a:p>
+          <a:p>
+            <a:pPr lvl="1"/>
+            <a:r>
+              <a:rPr lang="en-US" dirty="0"/>
+              <a:t>~70% valid SMILES @ T=1,2</a:t>
+            </a:r>
+          </a:p>
+          <a:p>
+            <a:pPr lvl="1"/>
+            <a:r>
+              <a:rPr lang="en-US" dirty="0"/>
+              <a:t>~98% valid SMILES @ T=0,5</a:t>
             </a:r>
           </a:p>
           <a:p>
@@ -5657,6 +5827,58 @@
           </a:prstGeom>
         </p:spPr>
       </p:pic>
+      <p:sp>
+        <p:nvSpPr>
+          <p:cNvPr id="5" name="TextBox 4">
+            <a:extLst>
+              <a:ext uri="{FF2B5EF4-FFF2-40B4-BE49-F238E27FC236}">
+                <a16:creationId xmlns:a16="http://schemas.microsoft.com/office/drawing/2014/main" id="{34648250-D881-ABEE-942B-C9C516DE2273}"/>
+              </a:ext>
+            </a:extLst>
+          </p:cNvPr>
+          <p:cNvSpPr txBox="1"/>
+          <p:nvPr/>
+        </p:nvSpPr>
+        <p:spPr>
+          <a:xfrm>
+            <a:off x="4674393" y="6420405"/>
+            <a:ext cx="2843213" cy="369332"/>
+          </a:xfrm>
+          <a:prstGeom prst="rect">
+            <a:avLst/>
+          </a:prstGeom>
+          <a:noFill/>
+        </p:spPr>
+        <p:txBody>
+          <a:bodyPr wrap="square">
+            <a:spAutoFit/>
+          </a:bodyPr>
+          <a:lstStyle/>
+          <a:p>
+            <a:r>
+              <a:rPr lang="nl-NL" dirty="0" err="1">
+                <a:solidFill>
+                  <a:schemeClr val="bg1"/>
+                </a:solidFill>
+              </a:rPr>
+              <a:t>Gupta</a:t>
+            </a:r>
+            <a:r>
+              <a:rPr lang="nl-NL" dirty="0">
+                <a:solidFill>
+                  <a:schemeClr val="bg1"/>
+                </a:solidFill>
+              </a:rPr>
+              <a:t> et al. Mol. Inf. (2018)</a:t>
+            </a:r>
+            <a:endParaRPr lang="en-NL" dirty="0">
+              <a:solidFill>
+                <a:schemeClr val="bg1"/>
+              </a:solidFill>
+            </a:endParaRPr>
+          </a:p>
+        </p:txBody>
+      </p:sp>
     </p:spTree>
     <p:extLst>
       <p:ext uri="{BB962C8B-B14F-4D97-AF65-F5344CB8AC3E}">
@@ -5667,6 +5889,18 @@
   <p:clrMapOvr>
     <a:masterClrMapping/>
   </p:clrMapOvr>
+  <mc:AlternateContent xmlns:mc="http://schemas.openxmlformats.org/markup-compatibility/2006">
+    <mc:Choice xmlns:p159="http://schemas.microsoft.com/office/powerpoint/2015/09/main" Requires="p159">
+      <p:transition xmlns:p14="http://schemas.microsoft.com/office/powerpoint/2010/main" spd="slow" p14:dur="2000">
+        <p159:morph option="byObject"/>
+      </p:transition>
+    </mc:Choice>
+    <mc:Fallback>
+      <p:transition spd="slow">
+        <p:fade/>
+      </p:transition>
+    </mc:Fallback>
+  </mc:AlternateContent>
 </p:sld>
 </file>
 
@@ -5793,7 +6027,7 @@
             <a:pPr lvl="2"/>
             <a:r>
               <a:rPr lang="en-US" dirty="0"/>
-              <a:t>Generate 1 000 smiles</a:t>
+              <a:t>Generate 1 000 SMILES</a:t>
             </a:r>
           </a:p>
           <a:p>
@@ -6028,6 +6262,18 @@
   <p:clrMapOvr>
     <a:masterClrMapping/>
   </p:clrMapOvr>
+  <mc:AlternateContent xmlns:mc="http://schemas.openxmlformats.org/markup-compatibility/2006">
+    <mc:Choice xmlns:p159="http://schemas.microsoft.com/office/powerpoint/2015/09/main" Requires="p159">
+      <p:transition xmlns:p14="http://schemas.microsoft.com/office/powerpoint/2010/main" spd="slow" p14:dur="2000">
+        <p159:morph option="byObject"/>
+      </p:transition>
+    </mc:Choice>
+    <mc:Fallback>
+      <p:transition spd="slow">
+        <p:fade/>
+      </p:transition>
+    </mc:Fallback>
+  </mc:AlternateContent>
   <p:timing>
     <p:tnLst>
       <p:par>
@@ -6338,7 +6584,7 @@
         </p:blipFill>
         <p:spPr>
           <a:xfrm>
-            <a:off x="6760357" y="250688"/>
+            <a:off x="7266397" y="250688"/>
             <a:ext cx="3840000" cy="2880000"/>
           </a:xfrm>
           <a:prstGeom prst="rect">
@@ -6436,7 +6682,7 @@
             <a:pPr lvl="1"/>
             <a:r>
               <a:rPr lang="en-US" dirty="0"/>
-              <a:t>Generate 1 000</a:t>
+              <a:t>Generate 1 000 SMILES</a:t>
             </a:r>
           </a:p>
           <a:p>
@@ -6521,42 +6767,6 @@
           </a:p>
         </p:txBody>
       </p:sp>
-      <p:pic>
-        <p:nvPicPr>
-          <p:cNvPr id="16" name="Picture 15" descr="A graph of a number of smiles&#10;&#10;Description automatically generated">
-            <a:extLst>
-              <a:ext uri="{FF2B5EF4-FFF2-40B4-BE49-F238E27FC236}">
-                <a16:creationId xmlns:a16="http://schemas.microsoft.com/office/drawing/2014/main" id="{2813DE9F-8D64-E0A3-46AE-F0F810183748}"/>
-              </a:ext>
-            </a:extLst>
-          </p:cNvPr>
-          <p:cNvPicPr>
-            <a:picLocks noChangeAspect="1"/>
-          </p:cNvPicPr>
-          <p:nvPr/>
-        </p:nvPicPr>
-        <p:blipFill>
-          <a:blip r:embed="rId7">
-            <a:extLst>
-              <a:ext uri="{28A0092B-C50C-407E-A947-70E740481C1C}">
-                <a14:useLocalDpi xmlns:a14="http://schemas.microsoft.com/office/drawing/2010/main" val="0"/>
-              </a:ext>
-            </a:extLst>
-          </a:blip>
-          <a:stretch>
-            <a:fillRect/>
-          </a:stretch>
-        </p:blipFill>
-        <p:spPr>
-          <a:xfrm>
-            <a:off x="6760357" y="3202600"/>
-            <a:ext cx="3840000" cy="2880000"/>
-          </a:xfrm>
-          <a:prstGeom prst="rect">
-            <a:avLst/>
-          </a:prstGeom>
-        </p:spPr>
-      </p:pic>
       <p:sp>
         <p:nvSpPr>
           <p:cNvPr id="14" name="TextBox 13">
@@ -6613,6 +6823,42 @@
           </a:p>
         </p:txBody>
       </p:sp>
+      <p:pic>
+        <p:nvPicPr>
+          <p:cNvPr id="6" name="Picture 5" descr="A graph of a blue line&#10;&#10;Description automatically generated with medium confidence">
+            <a:extLst>
+              <a:ext uri="{FF2B5EF4-FFF2-40B4-BE49-F238E27FC236}">
+                <a16:creationId xmlns:a16="http://schemas.microsoft.com/office/drawing/2014/main" id="{4E6B0D5A-44A3-6A66-D7BF-7DFF511A276E}"/>
+              </a:ext>
+            </a:extLst>
+          </p:cNvPr>
+          <p:cNvPicPr>
+            <a:picLocks noChangeAspect="1"/>
+          </p:cNvPicPr>
+          <p:nvPr/>
+        </p:nvPicPr>
+        <p:blipFill>
+          <a:blip r:embed="rId7">
+            <a:extLst>
+              <a:ext uri="{28A0092B-C50C-407E-A947-70E740481C1C}">
+                <a14:useLocalDpi xmlns:a14="http://schemas.microsoft.com/office/drawing/2010/main" val="0"/>
+              </a:ext>
+            </a:extLst>
+          </a:blip>
+          <a:stretch>
+            <a:fillRect/>
+          </a:stretch>
+        </p:blipFill>
+        <p:spPr>
+          <a:xfrm>
+            <a:off x="7255866" y="3256544"/>
+            <a:ext cx="3840000" cy="2880000"/>
+          </a:xfrm>
+          <a:prstGeom prst="rect">
+            <a:avLst/>
+          </a:prstGeom>
+        </p:spPr>
+      </p:pic>
     </p:spTree>
     <p:extLst>
       <p:ext uri="{BB962C8B-B14F-4D97-AF65-F5344CB8AC3E}">
@@ -6623,6 +6869,18 @@
   <p:clrMapOvr>
     <a:masterClrMapping/>
   </p:clrMapOvr>
+  <mc:AlternateContent xmlns:mc="http://schemas.openxmlformats.org/markup-compatibility/2006">
+    <mc:Choice xmlns:p159="http://schemas.microsoft.com/office/powerpoint/2015/09/main" Requires="p159">
+      <p:transition xmlns:p14="http://schemas.microsoft.com/office/powerpoint/2010/main" spd="slow" p14:dur="2000">
+        <p159:morph option="byObject"/>
+      </p:transition>
+    </mc:Choice>
+    <mc:Fallback>
+      <p:transition spd="slow">
+        <p:fade/>
+      </p:transition>
+    </mc:Fallback>
+  </mc:AlternateContent>
   <p:timing>
     <p:tnLst>
       <p:par>
@@ -6765,7 +7023,7 @@
                                           </p:stCondLst>
                                         </p:cTn>
                                         <p:tgtEl>
-                                          <p:spTgt spid="16"/>
+                                          <p:spTgt spid="6"/>
                                         </p:tgtEl>
                                         <p:attrNameLst>
                                           <p:attrName>style.visibility</p:attrName>
@@ -6888,14 +7146,19 @@
           <a:p>
             <a:r>
               <a:rPr lang="en-US" dirty="0"/>
-              <a:t>LSTM RNN can be used to sample (valid) smiles</a:t>
-            </a:r>
+              <a:t>LSTM RNN can be used to sample (valid</a:t>
+            </a:r>
+            <a:r>
+              <a:rPr lang="en-US"/>
+              <a:t>) SMILES</a:t>
+            </a:r>
+            <a:endParaRPr lang="en-US" dirty="0"/>
           </a:p>
           <a:p>
             <a:pPr lvl="1"/>
             <a:r>
               <a:rPr lang="en-US" dirty="0"/>
-              <a:t>Training with (new) target data has been used</a:t>
+              <a:t>Post training with (new) target data has been used</a:t>
             </a:r>
           </a:p>
           <a:p>
@@ -6993,6 +7256,18 @@
   <p:clrMapOvr>
     <a:masterClrMapping/>
   </p:clrMapOvr>
+  <mc:AlternateContent xmlns:mc="http://schemas.openxmlformats.org/markup-compatibility/2006">
+    <mc:Choice xmlns:p159="http://schemas.microsoft.com/office/powerpoint/2015/09/main" Requires="p159">
+      <p:transition xmlns:p14="http://schemas.microsoft.com/office/powerpoint/2010/main" spd="slow" p14:dur="2000">
+        <p159:morph option="byObject"/>
+      </p:transition>
+    </mc:Choice>
+    <mc:Fallback>
+      <p:transition spd="slow">
+        <p:fade/>
+      </p:transition>
+    </mc:Fallback>
+  </mc:AlternateContent>
 </p:sld>
 </file>
 
@@ -7128,6 +7403,18 @@
   <p:clrMapOvr>
     <a:masterClrMapping/>
   </p:clrMapOvr>
+  <mc:AlternateContent xmlns:mc="http://schemas.openxmlformats.org/markup-compatibility/2006">
+    <mc:Choice xmlns:p159="http://schemas.microsoft.com/office/powerpoint/2015/09/main" Requires="p159">
+      <p:transition xmlns:p14="http://schemas.microsoft.com/office/powerpoint/2010/main" spd="slow" p14:dur="2000">
+        <p159:morph option="byObject"/>
+      </p:transition>
+    </mc:Choice>
+    <mc:Fallback>
+      <p:transition spd="slow">
+        <p:fade/>
+      </p:transition>
+    </mc:Fallback>
+  </mc:AlternateContent>
 </p:sld>
 </file>
 
@@ -7205,6 +7492,12 @@
           <a:p>
             <a:r>
               <a:rPr lang="en-US" dirty="0"/>
+              <a:t>Sequential generation</a:t>
+            </a:r>
+          </a:p>
+          <a:p>
+            <a:r>
+              <a:rPr lang="en-US" dirty="0"/>
               <a:t>Retention of past information</a:t>
             </a:r>
           </a:p>
@@ -7327,7 +7620,7 @@
         </p:blipFill>
         <p:spPr>
           <a:xfrm>
-            <a:off x="8907603" y="68263"/>
+            <a:off x="8175750" y="269458"/>
             <a:ext cx="3011463" cy="2779035"/>
           </a:xfrm>
           <a:prstGeom prst="rect">
@@ -7444,6 +7737,18 @@
   <p:clrMapOvr>
     <a:masterClrMapping/>
   </p:clrMapOvr>
+  <mc:AlternateContent xmlns:mc="http://schemas.openxmlformats.org/markup-compatibility/2006">
+    <mc:Choice xmlns:p159="http://schemas.microsoft.com/office/powerpoint/2015/09/main" Requires="p159">
+      <p:transition xmlns:p14="http://schemas.microsoft.com/office/powerpoint/2010/main" spd="slow" p14:dur="2000">
+        <p159:morph option="byObject"/>
+      </p:transition>
+    </mc:Choice>
+    <mc:Fallback>
+      <p:transition spd="slow">
+        <p:fade/>
+      </p:transition>
+    </mc:Fallback>
+  </mc:AlternateContent>
 </p:sld>
 </file>
 
@@ -7775,8 +8080,8 @@
           </a:p>
         </p:txBody>
       </p:sp>
-      <mc:AlternateContent xmlns:mc="http://schemas.openxmlformats.org/markup-compatibility/2006">
-        <mc:Choice xmlns:a14="http://schemas.microsoft.com/office/drawing/2010/main" Requires="a14">
+      <mc:AlternateContent xmlns:mc="http://schemas.openxmlformats.org/markup-compatibility/2006" xmlns:a14="http://schemas.microsoft.com/office/drawing/2010/main">
+        <mc:Choice Requires="a14">
           <p:sp>
             <p:nvSpPr>
               <p:cNvPr id="7" name="TextBox 6">
@@ -7805,6 +8110,7 @@
               </a:bodyPr>
               <a:lstStyle/>
               <a:p>
+                <a:pPr/>
                 <a14:m>
                   <m:oMathPara xmlns:m="http://schemas.openxmlformats.org/officeDocument/2006/math">
                     <m:oMathParaPr>
@@ -7975,7 +8281,7 @@
             </p:txBody>
           </p:sp>
         </mc:Choice>
-        <mc:Fallback>
+        <mc:Fallback xmlns="">
           <p:sp>
             <p:nvSpPr>
               <p:cNvPr id="7" name="TextBox 6">
@@ -8356,6 +8662,18 @@
   <p:clrMapOvr>
     <a:masterClrMapping/>
   </p:clrMapOvr>
+  <mc:AlternateContent xmlns:mc="http://schemas.openxmlformats.org/markup-compatibility/2006">
+    <mc:Choice xmlns:p159="http://schemas.microsoft.com/office/powerpoint/2015/09/main" Requires="p159">
+      <p:transition xmlns:p14="http://schemas.microsoft.com/office/powerpoint/2010/main" spd="slow" p14:dur="2000">
+        <p159:morph option="byObject"/>
+      </p:transition>
+    </mc:Choice>
+    <mc:Fallback>
+      <p:transition spd="slow">
+        <p:fade/>
+      </p:transition>
+    </mc:Fallback>
+  </mc:AlternateContent>
 </p:sld>
 </file>
 
@@ -9152,6 +9470,18 @@
   <p:clrMapOvr>
     <a:masterClrMapping/>
   </p:clrMapOvr>
+  <mc:AlternateContent xmlns:mc="http://schemas.openxmlformats.org/markup-compatibility/2006">
+    <mc:Choice xmlns:p159="http://schemas.microsoft.com/office/powerpoint/2015/09/main" Requires="p159">
+      <p:transition xmlns:p14="http://schemas.microsoft.com/office/powerpoint/2010/main" spd="slow" p14:dur="2000">
+        <p159:morph option="byObject"/>
+      </p:transition>
+    </mc:Choice>
+    <mc:Fallback>
+      <p:transition spd="slow">
+        <p:fade/>
+      </p:transition>
+    </mc:Fallback>
+  </mc:AlternateContent>
 </p:sld>
 </file>
 
@@ -9224,7 +9554,9 @@
           </a:xfrm>
         </p:spPr>
         <p:txBody>
-          <a:bodyPr/>
+          <a:bodyPr>
+            <a:normAutofit/>
+          </a:bodyPr>
           <a:lstStyle/>
           <a:p>
             <a:r>
@@ -9243,6 +9575,13 @@
             <a:pPr lvl="1"/>
             <a:r>
               <a:rPr lang="en-US" dirty="0"/>
+              <a:t>Input number of unique tokens</a:t>
+            </a:r>
+          </a:p>
+          <a:p>
+            <a:pPr lvl="1"/>
+            <a:r>
+              <a:rPr lang="en-US" dirty="0"/>
               <a:t>256 hidden features (h)</a:t>
             </a:r>
           </a:p>
@@ -9250,7 +9589,7 @@
             <a:pPr lvl="1"/>
             <a:r>
               <a:rPr lang="en-US" dirty="0"/>
-              <a:t>First layer 0.5 dropout second 0.3</a:t>
+              <a:t>First 0.5 and second 0.3 dropout</a:t>
             </a:r>
           </a:p>
           <a:p>
@@ -9969,6 +10308,18 @@
   <p:clrMapOvr>
     <a:masterClrMapping/>
   </p:clrMapOvr>
+  <mc:AlternateContent xmlns:mc="http://schemas.openxmlformats.org/markup-compatibility/2006">
+    <mc:Choice xmlns:p159="http://schemas.microsoft.com/office/powerpoint/2015/09/main" Requires="p159">
+      <p:transition xmlns:p14="http://schemas.microsoft.com/office/powerpoint/2010/main" spd="slow" p14:dur="2000">
+        <p159:morph option="byObject"/>
+      </p:transition>
+    </mc:Choice>
+    <mc:Fallback>
+      <p:transition spd="slow">
+        <p:fade/>
+      </p:transition>
+    </mc:Fallback>
+  </mc:AlternateContent>
 </p:sld>
 </file>
 
@@ -10059,7 +10410,7 @@
             <a:pPr lvl="1"/>
             <a:r>
               <a:rPr lang="en-US" dirty="0"/>
-              <a:t>542 673 (canonical) smiles</a:t>
+              <a:t>542 673 (canonical) SMILES</a:t>
             </a:r>
           </a:p>
           <a:p>
@@ -10231,6 +10582,18 @@
   <p:clrMapOvr>
     <a:masterClrMapping/>
   </p:clrMapOvr>
+  <mc:AlternateContent xmlns:mc="http://schemas.openxmlformats.org/markup-compatibility/2006">
+    <mc:Choice xmlns:p159="http://schemas.microsoft.com/office/powerpoint/2015/09/main" Requires="p159">
+      <p:transition xmlns:p14="http://schemas.microsoft.com/office/powerpoint/2010/main" spd="slow" p14:dur="2000">
+        <p159:morph option="byObject"/>
+      </p:transition>
+    </mc:Choice>
+    <mc:Fallback>
+      <p:transition spd="slow">
+        <p:fade/>
+      </p:transition>
+    </mc:Fallback>
+  </mc:AlternateContent>
 </p:sld>
 </file>
 
@@ -10864,6 +11227,18 @@
   <p:clrMapOvr>
     <a:masterClrMapping/>
   </p:clrMapOvr>
+  <mc:AlternateContent xmlns:mc="http://schemas.openxmlformats.org/markup-compatibility/2006">
+    <mc:Choice xmlns:p159="http://schemas.microsoft.com/office/powerpoint/2015/09/main" Requires="p159">
+      <p:transition xmlns:p14="http://schemas.microsoft.com/office/powerpoint/2010/main" spd="slow" p14:dur="2000">
+        <p159:morph option="byObject"/>
+      </p:transition>
+    </mc:Choice>
+    <mc:Fallback>
+      <p:transition spd="slow">
+        <p:fade/>
+      </p:transition>
+    </mc:Fallback>
+  </mc:AlternateContent>
 </p:sld>
 </file>
 
@@ -10941,14 +11316,14 @@
           <a:p>
             <a:r>
               <a:rPr lang="en-US" dirty="0"/>
-              <a:t>Rewarded preferred properties</a:t>
+              <a:t>Reward preferred properties</a:t>
             </a:r>
           </a:p>
           <a:p>
             <a:pPr lvl="1"/>
             <a:r>
               <a:rPr lang="en-US" dirty="0"/>
-              <a:t>Punished for large loss</a:t>
+              <a:t>Penalty for large loss</a:t>
             </a:r>
           </a:p>
           <a:p>
@@ -11018,8 +11393,8 @@
           </a:p>
         </p:txBody>
       </p:sp>
-      <mc:AlternateContent xmlns:mc="http://schemas.openxmlformats.org/markup-compatibility/2006">
-        <mc:Choice xmlns:a14="http://schemas.microsoft.com/office/drawing/2010/main" Requires="a14">
+      <mc:AlternateContent xmlns:mc="http://schemas.openxmlformats.org/markup-compatibility/2006" xmlns:a14="http://schemas.microsoft.com/office/drawing/2010/main">
+        <mc:Choice Requires="a14">
           <p:sp>
             <p:nvSpPr>
               <p:cNvPr id="5" name="TextBox 4">
@@ -11097,7 +11472,7 @@
             </p:txBody>
           </p:sp>
         </mc:Choice>
-        <mc:Fallback>
+        <mc:Fallback xmlns="">
           <p:sp>
             <p:nvSpPr>
               <p:cNvPr id="5" name="TextBox 4">
@@ -11340,6 +11715,18 @@
   <p:clrMapOvr>
     <a:masterClrMapping/>
   </p:clrMapOvr>
+  <mc:AlternateContent xmlns:mc="http://schemas.openxmlformats.org/markup-compatibility/2006">
+    <mc:Choice xmlns:p159="http://schemas.microsoft.com/office/powerpoint/2015/09/main" Requires="p159">
+      <p:transition xmlns:p14="http://schemas.microsoft.com/office/powerpoint/2010/main" spd="slow" p14:dur="2000">
+        <p159:morph option="byObject"/>
+      </p:transition>
+    </mc:Choice>
+    <mc:Fallback>
+      <p:transition spd="slow">
+        <p:fade/>
+      </p:transition>
+    </mc:Fallback>
+  </mc:AlternateContent>
 </p:sld>
 </file>
 

</xml_diff>